<commit_message>
change dataset to gronewald
</commit_message>
<xml_diff>
--- a/presentations/Finale Präsentation.pptx
+++ b/presentations/Finale Präsentation.pptx
@@ -342,7 +342,7 @@
             <a:fld id="{A32DC80D-291A-4ABB-A78B-0417274A267C}" type="datetime4">
               <a:rPr lang="de-DE"/>
               <a:pPr/>
-              <a:t>15. Oktober 2023</a:t>
+              <a:t>18. Oktober 2023</a:t>
             </a:fld>
             <a:endParaRPr lang="de-DE"/>
           </a:p>
@@ -733,7 +733,7 @@
             <a:fld id="{065B079B-E513-489A-8A1B-D7C78493EA86}" type="datetime4">
               <a:rPr lang="de-DE"/>
               <a:pPr/>
-              <a:t>15. Oktober 2023</a:t>
+              <a:t>18. Oktober 2023</a:t>
             </a:fld>
             <a:endParaRPr lang="de-DE"/>
           </a:p>
@@ -1876,7 +1876,7 @@
             <a:fld id="{065B079B-E513-489A-8A1B-D7C78493EA86}" type="datetime4">
               <a:rPr lang="de-DE" smtClean="0"/>
               <a:pPr/>
-              <a:t>15. Oktober 2023</a:t>
+              <a:t>18. Oktober 2023</a:t>
             </a:fld>
             <a:endParaRPr lang="de-DE"/>
           </a:p>
@@ -2033,7 +2033,7 @@
             <a:fld id="{065B079B-E513-489A-8A1B-D7C78493EA86}" type="datetime4">
               <a:rPr lang="de-DE" smtClean="0"/>
               <a:pPr/>
-              <a:t>15. Oktober 2023</a:t>
+              <a:t>18. Oktober 2023</a:t>
             </a:fld>
             <a:endParaRPr lang="de-DE"/>
           </a:p>
@@ -2168,7 +2168,7 @@
             <a:fld id="{065B079B-E513-489A-8A1B-D7C78493EA86}" type="datetime4">
               <a:rPr lang="de-DE" smtClean="0"/>
               <a:pPr/>
-              <a:t>15. Oktober 2023</a:t>
+              <a:t>18. Oktober 2023</a:t>
             </a:fld>
             <a:endParaRPr lang="de-DE"/>
           </a:p>
@@ -2311,7 +2311,7 @@
             <a:fld id="{065B079B-E513-489A-8A1B-D7C78493EA86}" type="datetime4">
               <a:rPr lang="de-DE" smtClean="0"/>
               <a:pPr/>
-              <a:t>15. Oktober 2023</a:t>
+              <a:t>18. Oktober 2023</a:t>
             </a:fld>
             <a:endParaRPr lang="de-DE"/>
           </a:p>
@@ -2454,7 +2454,7 @@
             <a:fld id="{065B079B-E513-489A-8A1B-D7C78493EA86}" type="datetime4">
               <a:rPr lang="de-DE" smtClean="0"/>
               <a:pPr/>
-              <a:t>15. Oktober 2023</a:t>
+              <a:t>18. Oktober 2023</a:t>
             </a:fld>
             <a:endParaRPr lang="de-DE"/>
           </a:p>
@@ -2589,7 +2589,7 @@
             <a:fld id="{065B079B-E513-489A-8A1B-D7C78493EA86}" type="datetime4">
               <a:rPr lang="de-DE" smtClean="0"/>
               <a:pPr/>
-              <a:t>15. Oktober 2023</a:t>
+              <a:t>18. Oktober 2023</a:t>
             </a:fld>
             <a:endParaRPr lang="de-DE"/>
           </a:p>
@@ -2793,7 +2793,7 @@
             <a:fld id="{065B079B-E513-489A-8A1B-D7C78493EA86}" type="datetime4">
               <a:rPr lang="de-DE" smtClean="0"/>
               <a:pPr/>
-              <a:t>15. Oktober 2023</a:t>
+              <a:t>18. Oktober 2023</a:t>
             </a:fld>
             <a:endParaRPr lang="de-DE"/>
           </a:p>
@@ -2943,7 +2943,7 @@
             <a:fld id="{065B079B-E513-489A-8A1B-D7C78493EA86}" type="datetime4">
               <a:rPr lang="de-DE" smtClean="0"/>
               <a:pPr/>
-              <a:t>15. Oktober 2023</a:t>
+              <a:t>18. Oktober 2023</a:t>
             </a:fld>
             <a:endParaRPr lang="de-DE"/>
           </a:p>
@@ -3117,7 +3117,7 @@
             <a:fld id="{065B079B-E513-489A-8A1B-D7C78493EA86}" type="datetime4">
               <a:rPr lang="de-DE" smtClean="0"/>
               <a:pPr/>
-              <a:t>15. Oktober 2023</a:t>
+              <a:t>18. Oktober 2023</a:t>
             </a:fld>
             <a:endParaRPr lang="de-DE"/>
           </a:p>
@@ -3268,7 +3268,7 @@
             <a:fld id="{065B079B-E513-489A-8A1B-D7C78493EA86}" type="datetime4">
               <a:rPr lang="de-DE" smtClean="0"/>
               <a:pPr/>
-              <a:t>15. Oktober 2023</a:t>
+              <a:t>18. Oktober 2023</a:t>
             </a:fld>
             <a:endParaRPr lang="de-DE"/>
           </a:p>
@@ -3425,7 +3425,7 @@
             <a:fld id="{065B079B-E513-489A-8A1B-D7C78493EA86}" type="datetime4">
               <a:rPr lang="de-DE" smtClean="0"/>
               <a:pPr/>
-              <a:t>15. Oktober 2023</a:t>
+              <a:t>18. Oktober 2023</a:t>
             </a:fld>
             <a:endParaRPr lang="de-DE"/>
           </a:p>
@@ -7728,7 +7728,7 @@
           <a:p>
             <a:r>
               <a:rPr lang="de-DE" dirty="0"/>
-              <a:t>Scenario 3: </a:t>
+              <a:t>Scenario 2: </a:t>
             </a:r>
             <a:r>
               <a:rPr lang="en-US" b="1" dirty="0"/>
@@ -8344,7 +8344,7 @@
           <a:p>
             <a:r>
               <a:rPr lang="de-DE" dirty="0"/>
-              <a:t>Scenario 3: </a:t>
+              <a:t>Scenario 2: </a:t>
             </a:r>
             <a:r>
               <a:rPr lang="en-US" b="1" dirty="0"/>
@@ -8446,7 +8446,7 @@
           <a:p>
             <a:r>
               <a:rPr lang="de-DE" dirty="0"/>
-              <a:t>Scenario 3: </a:t>
+              <a:t>Scenario 2: </a:t>
             </a:r>
             <a:r>
               <a:rPr lang="en-US" b="1" dirty="0"/>
@@ -10066,7 +10066,7 @@
             <a:pPr algn="ctr"/>
             <a:r>
               <a:rPr lang="en-US" dirty="0"/>
-              <a:t>Create Social Media Graph</a:t>
+              <a:t>Social Media Graph</a:t>
             </a:r>
           </a:p>
           <a:p>
@@ -10216,15 +10216,7 @@
             <a:pPr algn="ctr"/>
             <a:r>
               <a:rPr lang="de-DE" dirty="0"/>
-              <a:t>Model </a:t>
-            </a:r>
-            <a:r>
-              <a:rPr lang="de-DE" dirty="0" err="1"/>
-              <a:t>the</a:t>
-            </a:r>
-            <a:r>
-              <a:rPr lang="de-DE" dirty="0"/>
-              <a:t> Information Diffusion</a:t>
+              <a:t>Information Diffusion Model</a:t>
             </a:r>
           </a:p>
           <a:p>
@@ -10336,11 +10328,8 @@
             <a:pPr algn="ctr"/>
             <a:r>
               <a:rPr lang="en-US" dirty="0"/>
-              <a:t>Estimate the Power Demand</a:t>
-            </a:r>
-          </a:p>
-          <a:p>
-            <a:pPr algn="ctr"/>
+              <a:t>Power Demand Simulation Rules</a:t>
+            </a:r>
             <a:endParaRPr lang="de-DE" dirty="0"/>
           </a:p>
           <a:p>
@@ -10870,7 +10859,7 @@
         <p:spPr>
           <a:xfrm>
             <a:off x="478368" y="1546538"/>
-            <a:ext cx="8856156" cy="1616955"/>
+            <a:ext cx="8856156" cy="2098486"/>
           </a:xfrm>
           <a:prstGeom prst="roundRect">
             <a:avLst/>
@@ -10997,18 +10986,6 @@
             <a:r>
               <a:rPr lang="de-DE" sz="1800" b="0" dirty="0" err="1"/>
               <a:t>world</a:t>
-            </a:r>
-            <a:r>
-              <a:rPr lang="de-DE" sz="1800" b="0" dirty="0"/>
-              <a:t> </a:t>
-            </a:r>
-            <a:r>
-              <a:rPr lang="de-DE" dirty="0" err="1"/>
-              <a:t>c</a:t>
-            </a:r>
-            <a:r>
-              <a:rPr lang="de-DE" sz="1800" b="0" dirty="0" err="1"/>
-              <a:t>haracteristic</a:t>
             </a:r>
             <a:endParaRPr lang="de-DE" sz="1800" b="0" dirty="0"/>
           </a:p>
@@ -11116,8 +11093,8 @@
         </p:nvSpPr>
         <p:spPr>
           <a:xfrm>
-            <a:off x="478368" y="3284985"/>
-            <a:ext cx="8856156" cy="2943044"/>
+            <a:off x="478368" y="3789039"/>
+            <a:ext cx="8856156" cy="2438989"/>
           </a:xfrm>
           <a:prstGeom prst="roundRect">
             <a:avLst/>
@@ -11354,59 +11331,6 @@
                 <a:schemeClr val="tx1"/>
               </a:solidFill>
             </a:endParaRPr>
-          </a:p>
-          <a:p>
-            <a:pPr marL="522900" indent="-342900">
-              <a:spcBef>
-                <a:spcPts val="200"/>
-              </a:spcBef>
-              <a:spcAft>
-                <a:spcPts val="230"/>
-              </a:spcAft>
-              <a:buFont typeface="Arial" panose="020B0604020202020204" pitchFamily="34" charset="0"/>
-              <a:buChar char="•"/>
-            </a:pPr>
-            <a:r>
-              <a:rPr lang="en-US" dirty="0"/>
-              <a:t>N</a:t>
-            </a:r>
-            <a:r>
-              <a:rPr lang="en-US" sz="1800" b="0" dirty="0"/>
-              <a:t>eighbors are predominantly infected </a:t>
-            </a:r>
-            <a:r>
-              <a:rPr lang="en-US" sz="1800" b="0" dirty="0">
-                <a:sym typeface="Wingdings" panose="05000000000000000000" pitchFamily="2" charset="2"/>
-              </a:rPr>
-              <a:t> node becomes infected</a:t>
-            </a:r>
-          </a:p>
-          <a:p>
-            <a:pPr marL="522900" indent="-342900">
-              <a:spcBef>
-                <a:spcPts val="200"/>
-              </a:spcBef>
-              <a:spcAft>
-                <a:spcPts val="230"/>
-              </a:spcAft>
-              <a:buFont typeface="Arial" panose="020B0604020202020204" pitchFamily="34" charset="0"/>
-              <a:buChar char="•"/>
-            </a:pPr>
-            <a:r>
-              <a:rPr lang="en-US" dirty="0"/>
-              <a:t>N</a:t>
-            </a:r>
-            <a:r>
-              <a:rPr lang="en-US" sz="1800" b="0" dirty="0"/>
-              <a:t>eighbors are predominantly recovered </a:t>
-            </a:r>
-            <a:r>
-              <a:rPr lang="en-US" sz="1800" b="0" dirty="0">
-                <a:sym typeface="Wingdings" panose="05000000000000000000" pitchFamily="2" charset="2"/>
-              </a:rPr>
-              <a:t> node recovers</a:t>
-            </a:r>
-            <a:endParaRPr lang="en-US" sz="1800" b="0" dirty="0"/>
           </a:p>
           <a:p>
             <a:endParaRPr lang="de-DE" sz="1800" b="0" dirty="0"/>
@@ -12295,8 +12219,8 @@
         </p:nvCxnSpPr>
         <p:spPr>
           <a:xfrm>
-            <a:off x="5479040" y="2921164"/>
-            <a:ext cx="1252694" cy="553608"/>
+            <a:off x="5525771" y="2953286"/>
+            <a:ext cx="1205963" cy="521486"/>
           </a:xfrm>
           <a:prstGeom prst="straightConnector1">
             <a:avLst/>
@@ -15832,8 +15756,8 @@
           </a:fontRef>
         </p:style>
       </p:cxnSp>
-      <mc:AlternateContent xmlns:mc="http://schemas.openxmlformats.org/markup-compatibility/2006" xmlns:a14="http://schemas.microsoft.com/office/drawing/2010/main">
-        <mc:Choice Requires="a14">
+      <mc:AlternateContent xmlns:mc="http://schemas.openxmlformats.org/markup-compatibility/2006">
+        <mc:Choice xmlns:a14="http://schemas.microsoft.com/office/drawing/2010/main" Requires="a14">
           <p:sp>
             <p:nvSpPr>
               <p:cNvPr id="11" name="Rechteck: abgerundete Ecken 10">
@@ -16301,7 +16225,7 @@
                           <a:latin typeface="Cambria Math" panose="02040503050406030204" pitchFamily="18" charset="0"/>
                           <a:ea typeface="Cambria Math" panose="02040503050406030204" pitchFamily="18" charset="0"/>
                         </a:rPr>
-                        <m:t>𝑅</m:t>
+                        <m:t>𝑆</m:t>
                       </m:r>
                       <m:d>
                         <m:dPr>
@@ -16677,11 +16601,11 @@
                         <m:t>∙</m:t>
                       </m:r>
                       <m:r>
-                        <a:rPr lang="de-DE" sz="1600" i="1">
+                        <a:rPr lang="de-DE" sz="1600" b="0" i="1" smtClean="0">
                           <a:latin typeface="Cambria Math" panose="02040503050406030204" pitchFamily="18" charset="0"/>
                           <a:ea typeface="Cambria Math" panose="02040503050406030204" pitchFamily="18" charset="0"/>
                         </a:rPr>
-                        <m:t>𝑅</m:t>
+                        <m:t>𝑆</m:t>
                       </m:r>
                       <m:d>
                         <m:dPr>
@@ -16927,43 +16851,6 @@
                         <a:ea typeface="Cambria Math" panose="02040503050406030204" pitchFamily="18" charset="0"/>
                         <a:sym typeface="Wingdings" panose="05000000000000000000" pitchFamily="2" charset="2"/>
                       </a:rPr>
-                      <m:t>𝑆</m:t>
-                    </m:r>
-                    <m:d>
-                      <m:dPr>
-                        <m:ctrlPr>
-                          <a:rPr lang="de-DE" sz="1600" b="0" i="1" smtClean="0">
-                            <a:latin typeface="Cambria Math" panose="02040503050406030204" pitchFamily="18" charset="0"/>
-                            <a:ea typeface="Cambria Math" panose="02040503050406030204" pitchFamily="18" charset="0"/>
-                            <a:sym typeface="Wingdings" panose="05000000000000000000" pitchFamily="2" charset="2"/>
-                          </a:rPr>
-                        </m:ctrlPr>
-                      </m:dPr>
-                      <m:e>
-                        <m:r>
-                          <a:rPr lang="de-DE" sz="1600" b="0" i="1" smtClean="0">
-                            <a:latin typeface="Cambria Math" panose="02040503050406030204" pitchFamily="18" charset="0"/>
-                            <a:ea typeface="Cambria Math" panose="02040503050406030204" pitchFamily="18" charset="0"/>
-                            <a:sym typeface="Wingdings" panose="05000000000000000000" pitchFamily="2" charset="2"/>
-                          </a:rPr>
-                          <m:t>0</m:t>
-                        </m:r>
-                      </m:e>
-                    </m:d>
-                    <m:r>
-                      <a:rPr lang="de-DE" sz="1600" b="0" i="1" smtClean="0">
-                        <a:latin typeface="Cambria Math" panose="02040503050406030204" pitchFamily="18" charset="0"/>
-                        <a:ea typeface="Cambria Math" panose="02040503050406030204" pitchFamily="18" charset="0"/>
-                        <a:sym typeface="Wingdings" panose="05000000000000000000" pitchFamily="2" charset="2"/>
-                      </a:rPr>
-                      <m:t>,  </m:t>
-                    </m:r>
-                    <m:r>
-                      <a:rPr lang="de-DE" sz="1600" b="0" i="1" smtClean="0">
-                        <a:latin typeface="Cambria Math" panose="02040503050406030204" pitchFamily="18" charset="0"/>
-                        <a:ea typeface="Cambria Math" panose="02040503050406030204" pitchFamily="18" charset="0"/>
-                        <a:sym typeface="Wingdings" panose="05000000000000000000" pitchFamily="2" charset="2"/>
-                      </a:rPr>
                       <m:t>𝐼</m:t>
                     </m:r>
                     <m:d>
@@ -17022,7 +16909,7 @@
             </p:txBody>
           </p:sp>
         </mc:Choice>
-        <mc:Fallback xmlns="">
+        <mc:Fallback>
           <p:sp>
             <p:nvSpPr>
               <p:cNvPr id="11" name="Rechteck: abgerundete Ecken 10">

</xml_diff>